<commit_message>
design pattern : mini update GUI : mini update
</commit_message>
<xml_diff>
--- a/17-POO-design-pattern/syllabus_17.pptx
+++ b/17-POO-design-pattern/syllabus_17.pptx
@@ -342,7 +342,7 @@
       </p15:notesGuideLst>
     </p:ext>
     <p:ext uri="http://customooxmlschemas.google.com/">
-      <go:slidesCustomData xmlns="" xmlns:mc="http://schemas.openxmlformats.org/markup-compatibility/2006" xmlns:mv="urn:schemas-microsoft-com:mac:vml" xmlns:c="http://schemas.openxmlformats.org/drawingml/2006/chart" xmlns:dgm="http://schemas.openxmlformats.org/drawingml/2006/diagram" xmlns:o="urn:schemas-microsoft-com:office:office" xmlns:v="urn:schemas-microsoft-com:vml" xmlns:pvml="urn:schemas-microsoft-com:office:powerpoint" xmlns:com="http://schemas.openxmlformats.org/drawingml/2006/compatibility" xmlns:p14="http://schemas.microsoft.com/office/powerpoint/2010/main" xmlns:p15="http://schemas.microsoft.com/office/powerpoint/2012/main" xmlns:ahyp="http://schemas.microsoft.com/office/drawing/2018/hyperlinkcolor" xmlns:go="http://customooxmlschemas.google.com/" r:id="rId88" roundtripDataSignature="AMtx7mjSZQRmqTMWKYRBXmlYNJjeBKn4Mw=="/>
+      <go:slidesCustomData xmlns:go="http://customooxmlschemas.google.com/" xmlns:ahyp="http://schemas.microsoft.com/office/drawing/2018/hyperlinkcolor" xmlns:p15="http://schemas.microsoft.com/office/powerpoint/2012/main" xmlns:p14="http://schemas.microsoft.com/office/powerpoint/2010/main" xmlns:com="http://schemas.openxmlformats.org/drawingml/2006/compatibility" xmlns:pvml="urn:schemas-microsoft-com:office:powerpoint" xmlns:v="urn:schemas-microsoft-com:vml" xmlns:o="urn:schemas-microsoft-com:office:office" xmlns:dgm="http://schemas.openxmlformats.org/drawingml/2006/diagram" xmlns:c="http://schemas.openxmlformats.org/drawingml/2006/chart" xmlns:mv="urn:schemas-microsoft-com:mac:vml" xmlns:mc="http://schemas.openxmlformats.org/markup-compatibility/2006" xmlns="" r:id="rId88" roundtripDataSignature="AMtx7mjSZQRmqTMWKYRBXmlYNJjeBKn4Mw=="/>
     </p:ext>
   </p:extLst>
 </p:presentation>
@@ -3157,7 +3157,7 @@
           <a:p>
             <a:fld id="{F3953782-D06E-4853-BE3C-64C197273937}" type="datetimeFigureOut">
               <a:rPr lang="fr-BE" smtClean="0"/>
-              <a:t>19-12-25</a:t>
+              <a:t>07-01-26</a:t>
             </a:fld>
             <a:endParaRPr lang="fr-BE"/>
           </a:p>
@@ -3647,7 +3647,7 @@
         <p14:reveal/>
       </p:transition>
     </mc:Choice>
-    <mc:Fallback xmlns="" xmlns:mv="urn:schemas-microsoft-com:mac:vml" xmlns:c="http://schemas.openxmlformats.org/drawingml/2006/chart" xmlns:dgm="http://schemas.openxmlformats.org/drawingml/2006/diagram" xmlns:o="urn:schemas-microsoft-com:office:office" xmlns:v="urn:schemas-microsoft-com:vml" xmlns:pvml="urn:schemas-microsoft-com:office:powerpoint" xmlns:com="http://schemas.openxmlformats.org/drawingml/2006/compatibility" xmlns:p15="http://schemas.microsoft.com/office/powerpoint/2012/main" xmlns:ahyp="http://schemas.microsoft.com/office/drawing/2018/hyperlinkcolor">
+    <mc:Fallback xmlns:ahyp="http://schemas.microsoft.com/office/drawing/2018/hyperlinkcolor" xmlns:p15="http://schemas.microsoft.com/office/powerpoint/2012/main" xmlns:com="http://schemas.openxmlformats.org/drawingml/2006/compatibility" xmlns:pvml="urn:schemas-microsoft-com:office:powerpoint" xmlns:v="urn:schemas-microsoft-com:vml" xmlns:o="urn:schemas-microsoft-com:office:office" xmlns:dgm="http://schemas.openxmlformats.org/drawingml/2006/diagram" xmlns:c="http://schemas.openxmlformats.org/drawingml/2006/chart" xmlns:mv="urn:schemas-microsoft-com:mac:vml" xmlns="">
       <p:transition spd="med">
         <p:fade/>
       </p:transition>
@@ -3818,7 +3818,7 @@
           <a:p>
             <a:fld id="{F3953782-D06E-4853-BE3C-64C197273937}" type="datetimeFigureOut">
               <a:rPr lang="fr-BE" smtClean="0"/>
-              <a:t>19-12-25</a:t>
+              <a:t>07-01-26</a:t>
             </a:fld>
             <a:endParaRPr lang="fr-BE"/>
           </a:p>
@@ -4135,7 +4135,7 @@
           <a:p>
             <a:fld id="{F3953782-D06E-4853-BE3C-64C197273937}" type="datetimeFigureOut">
               <a:rPr lang="fr-BE" smtClean="0"/>
-              <a:t>19-12-25</a:t>
+              <a:t>07-01-26</a:t>
             </a:fld>
             <a:endParaRPr lang="fr-BE"/>
           </a:p>
@@ -4333,7 +4333,7 @@
           <a:p>
             <a:fld id="{F3953782-D06E-4853-BE3C-64C197273937}" type="datetimeFigureOut">
               <a:rPr lang="fr-BE" smtClean="0"/>
-              <a:t>19-12-25</a:t>
+              <a:t>07-01-26</a:t>
             </a:fld>
             <a:endParaRPr lang="fr-BE"/>
           </a:p>
@@ -4596,7 +4596,7 @@
           <a:p>
             <a:fld id="{F3953782-D06E-4853-BE3C-64C197273937}" type="datetimeFigureOut">
               <a:rPr lang="fr-BE" smtClean="0"/>
-              <a:t>19-12-25</a:t>
+              <a:t>07-01-26</a:t>
             </a:fld>
             <a:endParaRPr lang="fr-BE"/>
           </a:p>
@@ -4994,7 +4994,7 @@
           <a:p>
             <a:fld id="{F3953782-D06E-4853-BE3C-64C197273937}" type="datetimeFigureOut">
               <a:rPr lang="fr-BE" smtClean="0"/>
-              <a:t>19-12-25</a:t>
+              <a:t>07-01-26</a:t>
             </a:fld>
             <a:endParaRPr lang="fr-BE"/>
           </a:p>
@@ -5143,7 +5143,7 @@
           <a:p>
             <a:fld id="{F3953782-D06E-4853-BE3C-64C197273937}" type="datetimeFigureOut">
               <a:rPr lang="fr-BE" smtClean="0"/>
-              <a:t>19-12-25</a:t>
+              <a:t>07-01-26</a:t>
             </a:fld>
             <a:endParaRPr lang="fr-BE"/>
           </a:p>
@@ -5494,7 +5494,7 @@
           <a:p>
             <a:fld id="{F3953782-D06E-4853-BE3C-64C197273937}" type="datetimeFigureOut">
               <a:rPr lang="fr-BE" smtClean="0"/>
-              <a:t>19-12-25</a:t>
+              <a:t>07-01-26</a:t>
             </a:fld>
             <a:endParaRPr lang="fr-BE"/>
           </a:p>
@@ -5821,7 +5821,7 @@
           <a:p>
             <a:fld id="{F3953782-D06E-4853-BE3C-64C197273937}" type="datetimeFigureOut">
               <a:rPr lang="fr-BE" smtClean="0"/>
-              <a:t>19-12-25</a:t>
+              <a:t>07-01-26</a:t>
             </a:fld>
             <a:endParaRPr lang="fr-BE"/>
           </a:p>
@@ -6763,7 +6763,7 @@
         <p14:reveal/>
       </p:transition>
     </mc:Choice>
-    <mc:Fallback xmlns="" xmlns:mv="urn:schemas-microsoft-com:mac:vml" xmlns:c="http://schemas.openxmlformats.org/drawingml/2006/chart" xmlns:dgm="http://schemas.openxmlformats.org/drawingml/2006/diagram" xmlns:o="urn:schemas-microsoft-com:office:office" xmlns:v="urn:schemas-microsoft-com:vml" xmlns:pvml="urn:schemas-microsoft-com:office:powerpoint" xmlns:com="http://schemas.openxmlformats.org/drawingml/2006/compatibility" xmlns:p15="http://schemas.microsoft.com/office/powerpoint/2012/main" xmlns:ahyp="http://schemas.microsoft.com/office/drawing/2018/hyperlinkcolor">
+    <mc:Fallback xmlns:ahyp="http://schemas.microsoft.com/office/drawing/2018/hyperlinkcolor" xmlns:p15="http://schemas.microsoft.com/office/powerpoint/2012/main" xmlns:com="http://schemas.openxmlformats.org/drawingml/2006/compatibility" xmlns:pvml="urn:schemas-microsoft-com:office:powerpoint" xmlns:v="urn:schemas-microsoft-com:vml" xmlns:o="urn:schemas-microsoft-com:office:office" xmlns:dgm="http://schemas.openxmlformats.org/drawingml/2006/diagram" xmlns:c="http://schemas.openxmlformats.org/drawingml/2006/chart" xmlns:mv="urn:schemas-microsoft-com:mac:vml" xmlns="">
       <p:transition spd="med">
         <p:fade/>
       </p:transition>
@@ -6869,7 +6869,7 @@
         <p14:reveal/>
       </p:transition>
     </mc:Choice>
-    <mc:Fallback xmlns="" xmlns:mv="urn:schemas-microsoft-com:mac:vml" xmlns:c="http://schemas.openxmlformats.org/drawingml/2006/chart" xmlns:dgm="http://schemas.openxmlformats.org/drawingml/2006/diagram" xmlns:o="urn:schemas-microsoft-com:office:office" xmlns:v="urn:schemas-microsoft-com:vml" xmlns:pvml="urn:schemas-microsoft-com:office:powerpoint" xmlns:com="http://schemas.openxmlformats.org/drawingml/2006/compatibility" xmlns:p15="http://schemas.microsoft.com/office/powerpoint/2012/main" xmlns:ahyp="http://schemas.microsoft.com/office/drawing/2018/hyperlinkcolor">
+    <mc:Fallback xmlns:ahyp="http://schemas.microsoft.com/office/drawing/2018/hyperlinkcolor" xmlns:p15="http://schemas.microsoft.com/office/powerpoint/2012/main" xmlns:com="http://schemas.openxmlformats.org/drawingml/2006/compatibility" xmlns:pvml="urn:schemas-microsoft-com:office:powerpoint" xmlns:v="urn:schemas-microsoft-com:vml" xmlns:o="urn:schemas-microsoft-com:office:office" xmlns:dgm="http://schemas.openxmlformats.org/drawingml/2006/diagram" xmlns:c="http://schemas.openxmlformats.org/drawingml/2006/chart" xmlns:mv="urn:schemas-microsoft-com:mac:vml" xmlns="">
       <p:transition spd="med">
         <p:fade/>
       </p:transition>
@@ -7055,7 +7055,7 @@
         <p14:reveal/>
       </p:transition>
     </mc:Choice>
-    <mc:Fallback xmlns="" xmlns:mv="urn:schemas-microsoft-com:mac:vml" xmlns:c="http://schemas.openxmlformats.org/drawingml/2006/chart" xmlns:dgm="http://schemas.openxmlformats.org/drawingml/2006/diagram" xmlns:o="urn:schemas-microsoft-com:office:office" xmlns:v="urn:schemas-microsoft-com:vml" xmlns:pvml="urn:schemas-microsoft-com:office:powerpoint" xmlns:com="http://schemas.openxmlformats.org/drawingml/2006/compatibility" xmlns:p15="http://schemas.microsoft.com/office/powerpoint/2012/main" xmlns:ahyp="http://schemas.microsoft.com/office/drawing/2018/hyperlinkcolor">
+    <mc:Fallback xmlns:ahyp="http://schemas.microsoft.com/office/drawing/2018/hyperlinkcolor" xmlns:p15="http://schemas.microsoft.com/office/powerpoint/2012/main" xmlns:com="http://schemas.openxmlformats.org/drawingml/2006/compatibility" xmlns:pvml="urn:schemas-microsoft-com:office:powerpoint" xmlns:v="urn:schemas-microsoft-com:vml" xmlns:o="urn:schemas-microsoft-com:office:office" xmlns:dgm="http://schemas.openxmlformats.org/drawingml/2006/diagram" xmlns:c="http://schemas.openxmlformats.org/drawingml/2006/chart" xmlns:mv="urn:schemas-microsoft-com:mac:vml" xmlns="">
       <p:transition spd="med">
         <p:fade/>
       </p:transition>
@@ -7475,7 +7475,7 @@
         <p14:reveal/>
       </p:transition>
     </mc:Choice>
-    <mc:Fallback xmlns="" xmlns:mv="urn:schemas-microsoft-com:mac:vml" xmlns:c="http://schemas.openxmlformats.org/drawingml/2006/chart" xmlns:dgm="http://schemas.openxmlformats.org/drawingml/2006/diagram" xmlns:o="urn:schemas-microsoft-com:office:office" xmlns:v="urn:schemas-microsoft-com:vml" xmlns:pvml="urn:schemas-microsoft-com:office:powerpoint" xmlns:com="http://schemas.openxmlformats.org/drawingml/2006/compatibility" xmlns:p15="http://schemas.microsoft.com/office/powerpoint/2012/main" xmlns:ahyp="http://schemas.microsoft.com/office/drawing/2018/hyperlinkcolor">
+    <mc:Fallback xmlns:ahyp="http://schemas.microsoft.com/office/drawing/2018/hyperlinkcolor" xmlns:p15="http://schemas.microsoft.com/office/powerpoint/2012/main" xmlns:com="http://schemas.openxmlformats.org/drawingml/2006/compatibility" xmlns:pvml="urn:schemas-microsoft-com:office:powerpoint" xmlns:v="urn:schemas-microsoft-com:vml" xmlns:o="urn:schemas-microsoft-com:office:office" xmlns:dgm="http://schemas.openxmlformats.org/drawingml/2006/diagram" xmlns:c="http://schemas.openxmlformats.org/drawingml/2006/chart" xmlns:mv="urn:schemas-microsoft-com:mac:vml" xmlns="">
       <p:transition spd="med">
         <p:fade/>
       </p:transition>
@@ -9045,7 +9045,7 @@
         <p14:reveal/>
       </p:transition>
     </mc:Choice>
-    <mc:Fallback xmlns="" xmlns:mv="urn:schemas-microsoft-com:mac:vml" xmlns:c="http://schemas.openxmlformats.org/drawingml/2006/chart" xmlns:dgm="http://schemas.openxmlformats.org/drawingml/2006/diagram" xmlns:o="urn:schemas-microsoft-com:office:office" xmlns:v="urn:schemas-microsoft-com:vml" xmlns:pvml="urn:schemas-microsoft-com:office:powerpoint" xmlns:com="http://schemas.openxmlformats.org/drawingml/2006/compatibility" xmlns:p15="http://schemas.microsoft.com/office/powerpoint/2012/main" xmlns:ahyp="http://schemas.microsoft.com/office/drawing/2018/hyperlinkcolor">
+    <mc:Fallback xmlns:ahyp="http://schemas.microsoft.com/office/drawing/2018/hyperlinkcolor" xmlns:p15="http://schemas.microsoft.com/office/powerpoint/2012/main" xmlns:com="http://schemas.openxmlformats.org/drawingml/2006/compatibility" xmlns:pvml="urn:schemas-microsoft-com:office:powerpoint" xmlns:v="urn:schemas-microsoft-com:vml" xmlns:o="urn:schemas-microsoft-com:office:office" xmlns:dgm="http://schemas.openxmlformats.org/drawingml/2006/diagram" xmlns:c="http://schemas.openxmlformats.org/drawingml/2006/chart" xmlns:mv="urn:schemas-microsoft-com:mac:vml" xmlns="">
       <p:transition spd="med">
         <p:fade/>
       </p:transition>
@@ -9318,7 +9318,7 @@
         <p14:reveal/>
       </p:transition>
     </mc:Choice>
-    <mc:Fallback xmlns="" xmlns:mv="urn:schemas-microsoft-com:mac:vml" xmlns:c="http://schemas.openxmlformats.org/drawingml/2006/chart" xmlns:dgm="http://schemas.openxmlformats.org/drawingml/2006/diagram" xmlns:o="urn:schemas-microsoft-com:office:office" xmlns:v="urn:schemas-microsoft-com:vml" xmlns:pvml="urn:schemas-microsoft-com:office:powerpoint" xmlns:com="http://schemas.openxmlformats.org/drawingml/2006/compatibility" xmlns:p15="http://schemas.microsoft.com/office/powerpoint/2012/main" xmlns:ahyp="http://schemas.microsoft.com/office/drawing/2018/hyperlinkcolor">
+    <mc:Fallback xmlns:ahyp="http://schemas.microsoft.com/office/drawing/2018/hyperlinkcolor" xmlns:p15="http://schemas.microsoft.com/office/powerpoint/2012/main" xmlns:com="http://schemas.openxmlformats.org/drawingml/2006/compatibility" xmlns:pvml="urn:schemas-microsoft-com:office:powerpoint" xmlns:v="urn:schemas-microsoft-com:vml" xmlns:o="urn:schemas-microsoft-com:office:office" xmlns:dgm="http://schemas.openxmlformats.org/drawingml/2006/diagram" xmlns:c="http://schemas.openxmlformats.org/drawingml/2006/chart" xmlns:mv="urn:schemas-microsoft-com:mac:vml" xmlns="">
       <p:transition spd="med">
         <p:fade/>
       </p:transition>
@@ -9812,7 +9812,7 @@
         <p14:reveal/>
       </p:transition>
     </mc:Choice>
-    <mc:Fallback xmlns="" xmlns:mv="urn:schemas-microsoft-com:mac:vml" xmlns:c="http://schemas.openxmlformats.org/drawingml/2006/chart" xmlns:dgm="http://schemas.openxmlformats.org/drawingml/2006/diagram" xmlns:o="urn:schemas-microsoft-com:office:office" xmlns:v="urn:schemas-microsoft-com:vml" xmlns:pvml="urn:schemas-microsoft-com:office:powerpoint" xmlns:com="http://schemas.openxmlformats.org/drawingml/2006/compatibility" xmlns:p15="http://schemas.microsoft.com/office/powerpoint/2012/main" xmlns:ahyp="http://schemas.microsoft.com/office/drawing/2018/hyperlinkcolor">
+    <mc:Fallback xmlns:ahyp="http://schemas.microsoft.com/office/drawing/2018/hyperlinkcolor" xmlns:p15="http://schemas.microsoft.com/office/powerpoint/2012/main" xmlns:com="http://schemas.openxmlformats.org/drawingml/2006/compatibility" xmlns:pvml="urn:schemas-microsoft-com:office:powerpoint" xmlns:v="urn:schemas-microsoft-com:vml" xmlns:o="urn:schemas-microsoft-com:office:office" xmlns:dgm="http://schemas.openxmlformats.org/drawingml/2006/diagram" xmlns:c="http://schemas.openxmlformats.org/drawingml/2006/chart" xmlns:mv="urn:schemas-microsoft-com:mac:vml" xmlns="">
       <p:transition spd="med">
         <p:fade/>
       </p:transition>
@@ -10182,7 +10182,7 @@
         <p14:reveal/>
       </p:transition>
     </mc:Choice>
-    <mc:Fallback xmlns="" xmlns:mv="urn:schemas-microsoft-com:mac:vml" xmlns:c="http://schemas.openxmlformats.org/drawingml/2006/chart" xmlns:dgm="http://schemas.openxmlformats.org/drawingml/2006/diagram" xmlns:o="urn:schemas-microsoft-com:office:office" xmlns:v="urn:schemas-microsoft-com:vml" xmlns:pvml="urn:schemas-microsoft-com:office:powerpoint" xmlns:com="http://schemas.openxmlformats.org/drawingml/2006/compatibility" xmlns:p15="http://schemas.microsoft.com/office/powerpoint/2012/main" xmlns:ahyp="http://schemas.microsoft.com/office/drawing/2018/hyperlinkcolor">
+    <mc:Fallback xmlns:ahyp="http://schemas.microsoft.com/office/drawing/2018/hyperlinkcolor" xmlns:p15="http://schemas.microsoft.com/office/powerpoint/2012/main" xmlns:com="http://schemas.openxmlformats.org/drawingml/2006/compatibility" xmlns:pvml="urn:schemas-microsoft-com:office:powerpoint" xmlns:v="urn:schemas-microsoft-com:vml" xmlns:o="urn:schemas-microsoft-com:office:office" xmlns:dgm="http://schemas.openxmlformats.org/drawingml/2006/diagram" xmlns:c="http://schemas.openxmlformats.org/drawingml/2006/chart" xmlns:mv="urn:schemas-microsoft-com:mac:vml" xmlns="">
       <p:transition spd="med">
         <p:fade/>
       </p:transition>
@@ -11020,7 +11020,7 @@
         <p14:reveal/>
       </p:transition>
     </mc:Choice>
-    <mc:Fallback xmlns="" xmlns:mv="urn:schemas-microsoft-com:mac:vml" xmlns:c="http://schemas.openxmlformats.org/drawingml/2006/chart" xmlns:dgm="http://schemas.openxmlformats.org/drawingml/2006/diagram" xmlns:o="urn:schemas-microsoft-com:office:office" xmlns:v="urn:schemas-microsoft-com:vml" xmlns:pvml="urn:schemas-microsoft-com:office:powerpoint" xmlns:com="http://schemas.openxmlformats.org/drawingml/2006/compatibility" xmlns:p15="http://schemas.microsoft.com/office/powerpoint/2012/main" xmlns:ahyp="http://schemas.microsoft.com/office/drawing/2018/hyperlinkcolor">
+    <mc:Fallback xmlns:ahyp="http://schemas.microsoft.com/office/drawing/2018/hyperlinkcolor" xmlns:p15="http://schemas.microsoft.com/office/powerpoint/2012/main" xmlns:com="http://schemas.openxmlformats.org/drawingml/2006/compatibility" xmlns:pvml="urn:schemas-microsoft-com:office:powerpoint" xmlns:v="urn:schemas-microsoft-com:vml" xmlns:o="urn:schemas-microsoft-com:office:office" xmlns:dgm="http://schemas.openxmlformats.org/drawingml/2006/diagram" xmlns:c="http://schemas.openxmlformats.org/drawingml/2006/chart" xmlns:mv="urn:schemas-microsoft-com:mac:vml" xmlns="">
       <p:transition spd="med">
         <p:fade/>
       </p:transition>
@@ -11590,7 +11590,7 @@
         <p14:reveal/>
       </p:transition>
     </mc:Choice>
-    <mc:Fallback xmlns="" xmlns:mv="urn:schemas-microsoft-com:mac:vml" xmlns:c="http://schemas.openxmlformats.org/drawingml/2006/chart" xmlns:dgm="http://schemas.openxmlformats.org/drawingml/2006/diagram" xmlns:o="urn:schemas-microsoft-com:office:office" xmlns:v="urn:schemas-microsoft-com:vml" xmlns:pvml="urn:schemas-microsoft-com:office:powerpoint" xmlns:com="http://schemas.openxmlformats.org/drawingml/2006/compatibility" xmlns:p15="http://schemas.microsoft.com/office/powerpoint/2012/main" xmlns:ahyp="http://schemas.microsoft.com/office/drawing/2018/hyperlinkcolor">
+    <mc:Fallback xmlns:ahyp="http://schemas.microsoft.com/office/drawing/2018/hyperlinkcolor" xmlns:p15="http://schemas.microsoft.com/office/powerpoint/2012/main" xmlns:com="http://schemas.openxmlformats.org/drawingml/2006/compatibility" xmlns:pvml="urn:schemas-microsoft-com:office:powerpoint" xmlns:v="urn:schemas-microsoft-com:vml" xmlns:o="urn:schemas-microsoft-com:office:office" xmlns:dgm="http://schemas.openxmlformats.org/drawingml/2006/diagram" xmlns:c="http://schemas.openxmlformats.org/drawingml/2006/chart" xmlns:mv="urn:schemas-microsoft-com:mac:vml" xmlns="">
       <p:transition spd="med">
         <p:fade/>
       </p:transition>
@@ -12687,7 +12687,7 @@
         <p14:reveal/>
       </p:transition>
     </mc:Choice>
-    <mc:Fallback xmlns="" xmlns:mv="urn:schemas-microsoft-com:mac:vml" xmlns:c="http://schemas.openxmlformats.org/drawingml/2006/chart" xmlns:dgm="http://schemas.openxmlformats.org/drawingml/2006/diagram" xmlns:o="urn:schemas-microsoft-com:office:office" xmlns:v="urn:schemas-microsoft-com:vml" xmlns:pvml="urn:schemas-microsoft-com:office:powerpoint" xmlns:com="http://schemas.openxmlformats.org/drawingml/2006/compatibility" xmlns:p15="http://schemas.microsoft.com/office/powerpoint/2012/main" xmlns:ahyp="http://schemas.microsoft.com/office/drawing/2018/hyperlinkcolor">
+    <mc:Fallback xmlns:ahyp="http://schemas.microsoft.com/office/drawing/2018/hyperlinkcolor" xmlns:p15="http://schemas.microsoft.com/office/powerpoint/2012/main" xmlns:com="http://schemas.openxmlformats.org/drawingml/2006/compatibility" xmlns:pvml="urn:schemas-microsoft-com:office:powerpoint" xmlns:v="urn:schemas-microsoft-com:vml" xmlns:o="urn:schemas-microsoft-com:office:office" xmlns:dgm="http://schemas.openxmlformats.org/drawingml/2006/diagram" xmlns:c="http://schemas.openxmlformats.org/drawingml/2006/chart" xmlns:mv="urn:schemas-microsoft-com:mac:vml" xmlns="">
       <p:transition spd="med">
         <p:fade/>
       </p:transition>
@@ -12821,7 +12821,7 @@
         <p14:reveal/>
       </p:transition>
     </mc:Choice>
-    <mc:Fallback xmlns="" xmlns:mv="urn:schemas-microsoft-com:mac:vml" xmlns:c="http://schemas.openxmlformats.org/drawingml/2006/chart" xmlns:dgm="http://schemas.openxmlformats.org/drawingml/2006/diagram" xmlns:o="urn:schemas-microsoft-com:office:office" xmlns:v="urn:schemas-microsoft-com:vml" xmlns:pvml="urn:schemas-microsoft-com:office:powerpoint" xmlns:com="http://schemas.openxmlformats.org/drawingml/2006/compatibility" xmlns:p15="http://schemas.microsoft.com/office/powerpoint/2012/main" xmlns:ahyp="http://schemas.microsoft.com/office/drawing/2018/hyperlinkcolor">
+    <mc:Fallback xmlns:ahyp="http://schemas.microsoft.com/office/drawing/2018/hyperlinkcolor" xmlns:p15="http://schemas.microsoft.com/office/powerpoint/2012/main" xmlns:com="http://schemas.openxmlformats.org/drawingml/2006/compatibility" xmlns:pvml="urn:schemas-microsoft-com:office:powerpoint" xmlns:v="urn:schemas-microsoft-com:vml" xmlns:o="urn:schemas-microsoft-com:office:office" xmlns:dgm="http://schemas.openxmlformats.org/drawingml/2006/diagram" xmlns:c="http://schemas.openxmlformats.org/drawingml/2006/chart" xmlns:mv="urn:schemas-microsoft-com:mac:vml" xmlns="">
       <p:transition spd="med">
         <p:fade/>
       </p:transition>
@@ -13067,7 +13067,7 @@
         <p14:reveal/>
       </p:transition>
     </mc:Choice>
-    <mc:Fallback xmlns="" xmlns:mv="urn:schemas-microsoft-com:mac:vml" xmlns:c="http://schemas.openxmlformats.org/drawingml/2006/chart" xmlns:dgm="http://schemas.openxmlformats.org/drawingml/2006/diagram" xmlns:o="urn:schemas-microsoft-com:office:office" xmlns:v="urn:schemas-microsoft-com:vml" xmlns:pvml="urn:schemas-microsoft-com:office:powerpoint" xmlns:com="http://schemas.openxmlformats.org/drawingml/2006/compatibility" xmlns:p15="http://schemas.microsoft.com/office/powerpoint/2012/main" xmlns:ahyp="http://schemas.microsoft.com/office/drawing/2018/hyperlinkcolor">
+    <mc:Fallback xmlns:ahyp="http://schemas.microsoft.com/office/drawing/2018/hyperlinkcolor" xmlns:p15="http://schemas.microsoft.com/office/powerpoint/2012/main" xmlns:com="http://schemas.openxmlformats.org/drawingml/2006/compatibility" xmlns:pvml="urn:schemas-microsoft-com:office:powerpoint" xmlns:v="urn:schemas-microsoft-com:vml" xmlns:o="urn:schemas-microsoft-com:office:office" xmlns:dgm="http://schemas.openxmlformats.org/drawingml/2006/diagram" xmlns:c="http://schemas.openxmlformats.org/drawingml/2006/chart" xmlns:mv="urn:schemas-microsoft-com:mac:vml" xmlns="">
       <p:transition spd="med">
         <p:fade/>
       </p:transition>
@@ -13193,7 +13193,7 @@
         <p14:reveal/>
       </p:transition>
     </mc:Choice>
-    <mc:Fallback xmlns="" xmlns:mv="urn:schemas-microsoft-com:mac:vml" xmlns:c="http://schemas.openxmlformats.org/drawingml/2006/chart" xmlns:dgm="http://schemas.openxmlformats.org/drawingml/2006/diagram" xmlns:o="urn:schemas-microsoft-com:office:office" xmlns:v="urn:schemas-microsoft-com:vml" xmlns:pvml="urn:schemas-microsoft-com:office:powerpoint" xmlns:com="http://schemas.openxmlformats.org/drawingml/2006/compatibility" xmlns:p15="http://schemas.microsoft.com/office/powerpoint/2012/main" xmlns:ahyp="http://schemas.microsoft.com/office/drawing/2018/hyperlinkcolor">
+    <mc:Fallback xmlns:ahyp="http://schemas.microsoft.com/office/drawing/2018/hyperlinkcolor" xmlns:p15="http://schemas.microsoft.com/office/powerpoint/2012/main" xmlns:com="http://schemas.openxmlformats.org/drawingml/2006/compatibility" xmlns:pvml="urn:schemas-microsoft-com:office:powerpoint" xmlns:v="urn:schemas-microsoft-com:vml" xmlns:o="urn:schemas-microsoft-com:office:office" xmlns:dgm="http://schemas.openxmlformats.org/drawingml/2006/diagram" xmlns:c="http://schemas.openxmlformats.org/drawingml/2006/chart" xmlns:mv="urn:schemas-microsoft-com:mac:vml" xmlns="">
       <p:transition spd="med">
         <p:fade/>
       </p:transition>
@@ -13387,7 +13387,7 @@
         <p14:reveal/>
       </p:transition>
     </mc:Choice>
-    <mc:Fallback xmlns="" xmlns:mv="urn:schemas-microsoft-com:mac:vml" xmlns:c="http://schemas.openxmlformats.org/drawingml/2006/chart" xmlns:dgm="http://schemas.openxmlformats.org/drawingml/2006/diagram" xmlns:o="urn:schemas-microsoft-com:office:office" xmlns:v="urn:schemas-microsoft-com:vml" xmlns:pvml="urn:schemas-microsoft-com:office:powerpoint" xmlns:com="http://schemas.openxmlformats.org/drawingml/2006/compatibility" xmlns:p15="http://schemas.microsoft.com/office/powerpoint/2012/main" xmlns:ahyp="http://schemas.microsoft.com/office/drawing/2018/hyperlinkcolor">
+    <mc:Fallback xmlns:ahyp="http://schemas.microsoft.com/office/drawing/2018/hyperlinkcolor" xmlns:p15="http://schemas.microsoft.com/office/powerpoint/2012/main" xmlns:com="http://schemas.openxmlformats.org/drawingml/2006/compatibility" xmlns:pvml="urn:schemas-microsoft-com:office:powerpoint" xmlns:v="urn:schemas-microsoft-com:vml" xmlns:o="urn:schemas-microsoft-com:office:office" xmlns:dgm="http://schemas.openxmlformats.org/drawingml/2006/diagram" xmlns:c="http://schemas.openxmlformats.org/drawingml/2006/chart" xmlns:mv="urn:schemas-microsoft-com:mac:vml" xmlns="">
       <p:transition spd="med">
         <p:fade/>
       </p:transition>
@@ -13868,7 +13868,7 @@
         <p14:reveal/>
       </p:transition>
     </mc:Choice>
-    <mc:Fallback xmlns="" xmlns:mv="urn:schemas-microsoft-com:mac:vml" xmlns:c="http://schemas.openxmlformats.org/drawingml/2006/chart" xmlns:dgm="http://schemas.openxmlformats.org/drawingml/2006/diagram" xmlns:o="urn:schemas-microsoft-com:office:office" xmlns:v="urn:schemas-microsoft-com:vml" xmlns:pvml="urn:schemas-microsoft-com:office:powerpoint" xmlns:com="http://schemas.openxmlformats.org/drawingml/2006/compatibility" xmlns:p15="http://schemas.microsoft.com/office/powerpoint/2012/main" xmlns:ahyp="http://schemas.microsoft.com/office/drawing/2018/hyperlinkcolor">
+    <mc:Fallback xmlns:ahyp="http://schemas.microsoft.com/office/drawing/2018/hyperlinkcolor" xmlns:p15="http://schemas.microsoft.com/office/powerpoint/2012/main" xmlns:com="http://schemas.openxmlformats.org/drawingml/2006/compatibility" xmlns:pvml="urn:schemas-microsoft-com:office:powerpoint" xmlns:v="urn:schemas-microsoft-com:vml" xmlns:o="urn:schemas-microsoft-com:office:office" xmlns:dgm="http://schemas.openxmlformats.org/drawingml/2006/diagram" xmlns:c="http://schemas.openxmlformats.org/drawingml/2006/chart" xmlns:mv="urn:schemas-microsoft-com:mac:vml" xmlns="">
       <p:transition spd="med">
         <p:fade/>
       </p:transition>
@@ -14790,7 +14790,7 @@
         <p14:reveal/>
       </p:transition>
     </mc:Choice>
-    <mc:Fallback xmlns="" xmlns:mv="urn:schemas-microsoft-com:mac:vml" xmlns:c="http://schemas.openxmlformats.org/drawingml/2006/chart" xmlns:dgm="http://schemas.openxmlformats.org/drawingml/2006/diagram" xmlns:o="urn:schemas-microsoft-com:office:office" xmlns:v="urn:schemas-microsoft-com:vml" xmlns:pvml="urn:schemas-microsoft-com:office:powerpoint" xmlns:com="http://schemas.openxmlformats.org/drawingml/2006/compatibility" xmlns:p15="http://schemas.microsoft.com/office/powerpoint/2012/main" xmlns:ahyp="http://schemas.microsoft.com/office/drawing/2018/hyperlinkcolor">
+    <mc:Fallback xmlns:ahyp="http://schemas.microsoft.com/office/drawing/2018/hyperlinkcolor" xmlns:p15="http://schemas.microsoft.com/office/powerpoint/2012/main" xmlns:com="http://schemas.openxmlformats.org/drawingml/2006/compatibility" xmlns:pvml="urn:schemas-microsoft-com:office:powerpoint" xmlns:v="urn:schemas-microsoft-com:vml" xmlns:o="urn:schemas-microsoft-com:office:office" xmlns:dgm="http://schemas.openxmlformats.org/drawingml/2006/diagram" xmlns:c="http://schemas.openxmlformats.org/drawingml/2006/chart" xmlns:mv="urn:schemas-microsoft-com:mac:vml" xmlns="">
       <p:transition spd="med">
         <p:fade/>
       </p:transition>
@@ -14975,7 +14975,7 @@
         <p14:reveal/>
       </p:transition>
     </mc:Choice>
-    <mc:Fallback xmlns="" xmlns:mv="urn:schemas-microsoft-com:mac:vml" xmlns:c="http://schemas.openxmlformats.org/drawingml/2006/chart" xmlns:dgm="http://schemas.openxmlformats.org/drawingml/2006/diagram" xmlns:o="urn:schemas-microsoft-com:office:office" xmlns:v="urn:schemas-microsoft-com:vml" xmlns:pvml="urn:schemas-microsoft-com:office:powerpoint" xmlns:com="http://schemas.openxmlformats.org/drawingml/2006/compatibility" xmlns:p15="http://schemas.microsoft.com/office/powerpoint/2012/main" xmlns:ahyp="http://schemas.microsoft.com/office/drawing/2018/hyperlinkcolor">
+    <mc:Fallback xmlns:ahyp="http://schemas.microsoft.com/office/drawing/2018/hyperlinkcolor" xmlns:p15="http://schemas.microsoft.com/office/powerpoint/2012/main" xmlns:com="http://schemas.openxmlformats.org/drawingml/2006/compatibility" xmlns:pvml="urn:schemas-microsoft-com:office:powerpoint" xmlns:v="urn:schemas-microsoft-com:vml" xmlns:o="urn:schemas-microsoft-com:office:office" xmlns:dgm="http://schemas.openxmlformats.org/drawingml/2006/diagram" xmlns:c="http://schemas.openxmlformats.org/drawingml/2006/chart" xmlns:mv="urn:schemas-microsoft-com:mac:vml" xmlns="">
       <p:transition spd="med">
         <p:fade/>
       </p:transition>
@@ -15173,7 +15173,7 @@
         <p14:reveal/>
       </p:transition>
     </mc:Choice>
-    <mc:Fallback xmlns="" xmlns:mv="urn:schemas-microsoft-com:mac:vml" xmlns:c="http://schemas.openxmlformats.org/drawingml/2006/chart" xmlns:dgm="http://schemas.openxmlformats.org/drawingml/2006/diagram" xmlns:o="urn:schemas-microsoft-com:office:office" xmlns:v="urn:schemas-microsoft-com:vml" xmlns:pvml="urn:schemas-microsoft-com:office:powerpoint" xmlns:com="http://schemas.openxmlformats.org/drawingml/2006/compatibility" xmlns:p15="http://schemas.microsoft.com/office/powerpoint/2012/main" xmlns:ahyp="http://schemas.microsoft.com/office/drawing/2018/hyperlinkcolor">
+    <mc:Fallback xmlns:ahyp="http://schemas.microsoft.com/office/drawing/2018/hyperlinkcolor" xmlns:p15="http://schemas.microsoft.com/office/powerpoint/2012/main" xmlns:com="http://schemas.openxmlformats.org/drawingml/2006/compatibility" xmlns:pvml="urn:schemas-microsoft-com:office:powerpoint" xmlns:v="urn:schemas-microsoft-com:vml" xmlns:o="urn:schemas-microsoft-com:office:office" xmlns:dgm="http://schemas.openxmlformats.org/drawingml/2006/diagram" xmlns:c="http://schemas.openxmlformats.org/drawingml/2006/chart" xmlns:mv="urn:schemas-microsoft-com:mac:vml" xmlns="">
       <p:transition spd="med">
         <p:fade/>
       </p:transition>
@@ -16967,7 +16967,7 @@
         <p14:reveal/>
       </p:transition>
     </mc:Choice>
-    <mc:Fallback xmlns="" xmlns:mv="urn:schemas-microsoft-com:mac:vml" xmlns:c="http://schemas.openxmlformats.org/drawingml/2006/chart" xmlns:dgm="http://schemas.openxmlformats.org/drawingml/2006/diagram" xmlns:o="urn:schemas-microsoft-com:office:office" xmlns:v="urn:schemas-microsoft-com:vml" xmlns:pvml="urn:schemas-microsoft-com:office:powerpoint" xmlns:com="http://schemas.openxmlformats.org/drawingml/2006/compatibility" xmlns:p15="http://schemas.microsoft.com/office/powerpoint/2012/main" xmlns:ahyp="http://schemas.microsoft.com/office/drawing/2018/hyperlinkcolor">
+    <mc:Fallback xmlns:ahyp="http://schemas.microsoft.com/office/drawing/2018/hyperlinkcolor" xmlns:p15="http://schemas.microsoft.com/office/powerpoint/2012/main" xmlns:com="http://schemas.openxmlformats.org/drawingml/2006/compatibility" xmlns:pvml="urn:schemas-microsoft-com:office:powerpoint" xmlns:v="urn:schemas-microsoft-com:vml" xmlns:o="urn:schemas-microsoft-com:office:office" xmlns:dgm="http://schemas.openxmlformats.org/drawingml/2006/diagram" xmlns:c="http://schemas.openxmlformats.org/drawingml/2006/chart" xmlns:mv="urn:schemas-microsoft-com:mac:vml" xmlns="">
       <p:transition spd="med">
         <p:fade/>
       </p:transition>
@@ -17330,6 +17330,319 @@
           </a:extLst>
         </p:spPr>
       </p:pic>
+      <p:pic>
+        <p:nvPicPr>
+          <p:cNvPr id="5" name="Graphique 4" descr="Voiture avec un remplissage uni">
+            <a:extLst>
+              <a:ext uri="{FF2B5EF4-FFF2-40B4-BE49-F238E27FC236}">
+                <a16:creationId xmlns:a16="http://schemas.microsoft.com/office/drawing/2014/main" id="{248B274D-7F3F-85BF-11CB-CA28E92A8583}"/>
+              </a:ext>
+            </a:extLst>
+          </p:cNvPr>
+          <p:cNvPicPr>
+            <a:picLocks noChangeAspect="1"/>
+          </p:cNvPicPr>
+          <p:nvPr/>
+        </p:nvPicPr>
+        <p:blipFill>
+          <a:blip r:embed="rId3">
+            <a:extLst>
+              <a:ext uri="{96DAC541-7B7A-43D3-8B79-37D633B846F1}">
+                <asvg:svgBlip xmlns:asvg="http://schemas.microsoft.com/office/drawing/2016/SVG/main" r:embed="rId4"/>
+              </a:ext>
+            </a:extLst>
+          </a:blip>
+          <a:stretch>
+            <a:fillRect/>
+          </a:stretch>
+        </p:blipFill>
+        <p:spPr>
+          <a:xfrm>
+            <a:off x="987276" y="5997745"/>
+            <a:ext cx="720000" cy="720000"/>
+          </a:xfrm>
+          <a:prstGeom prst="rect">
+            <a:avLst/>
+          </a:prstGeom>
+        </p:spPr>
+      </p:pic>
+      <p:grpSp>
+        <p:nvGrpSpPr>
+          <p:cNvPr id="11" name="Groupe 10">
+            <a:extLst>
+              <a:ext uri="{FF2B5EF4-FFF2-40B4-BE49-F238E27FC236}">
+                <a16:creationId xmlns:a16="http://schemas.microsoft.com/office/drawing/2014/main" id="{75629BBB-DF1E-6A42-5703-7AEAB94FBB7E}"/>
+              </a:ext>
+            </a:extLst>
+          </p:cNvPr>
+          <p:cNvGrpSpPr/>
+          <p:nvPr/>
+        </p:nvGrpSpPr>
+        <p:grpSpPr>
+          <a:xfrm>
+            <a:off x="11243896" y="2691961"/>
+            <a:ext cx="720000" cy="1893426"/>
+            <a:chOff x="1152797" y="1558105"/>
+            <a:chExt cx="720000" cy="1893426"/>
+          </a:xfrm>
+        </p:grpSpPr>
+        <p:sp>
+          <p:nvSpPr>
+            <p:cNvPr id="4" name="Ellipse 3">
+              <a:extLst>
+                <a:ext uri="{FF2B5EF4-FFF2-40B4-BE49-F238E27FC236}">
+                  <a16:creationId xmlns:a16="http://schemas.microsoft.com/office/drawing/2014/main" id="{BBFEFEA5-DBFA-7827-BD19-6577EA8C11FF}"/>
+                </a:ext>
+              </a:extLst>
+            </p:cNvPr>
+            <p:cNvSpPr/>
+            <p:nvPr/>
+          </p:nvSpPr>
+          <p:spPr>
+            <a:xfrm>
+              <a:off x="1423205" y="1671411"/>
+              <a:ext cx="147142" cy="147142"/>
+            </a:xfrm>
+            <a:prstGeom prst="ellipse">
+              <a:avLst/>
+            </a:prstGeom>
+            <a:solidFill>
+              <a:srgbClr val="FF0000"/>
+            </a:solidFill>
+            <a:ln>
+              <a:solidFill>
+                <a:srgbClr val="FF0000"/>
+              </a:solidFill>
+            </a:ln>
+          </p:spPr>
+          <p:style>
+            <a:lnRef idx="2">
+              <a:schemeClr val="accent1">
+                <a:shade val="50000"/>
+              </a:schemeClr>
+            </a:lnRef>
+            <a:fillRef idx="1">
+              <a:schemeClr val="accent1"/>
+            </a:fillRef>
+            <a:effectRef idx="0">
+              <a:schemeClr val="accent1"/>
+            </a:effectRef>
+            <a:fontRef idx="minor">
+              <a:schemeClr val="lt1"/>
+            </a:fontRef>
+          </p:style>
+          <p:txBody>
+            <a:bodyPr rtlCol="0" anchor="ctr"/>
+            <a:lstStyle/>
+            <a:p>
+              <a:pPr algn="ctr"/>
+              <a:endParaRPr lang="fr-BE"/>
+            </a:p>
+          </p:txBody>
+        </p:sp>
+        <p:grpSp>
+          <p:nvGrpSpPr>
+            <p:cNvPr id="8" name="Groupe 7">
+              <a:extLst>
+                <a:ext uri="{FF2B5EF4-FFF2-40B4-BE49-F238E27FC236}">
+                  <a16:creationId xmlns:a16="http://schemas.microsoft.com/office/drawing/2014/main" id="{195FFB73-525F-DDBE-1551-8AD960DE0DCF}"/>
+                </a:ext>
+              </a:extLst>
+            </p:cNvPr>
+            <p:cNvGrpSpPr/>
+            <p:nvPr/>
+          </p:nvGrpSpPr>
+          <p:grpSpPr>
+            <a:xfrm>
+              <a:off x="1152797" y="1558105"/>
+              <a:ext cx="720000" cy="1893426"/>
+              <a:chOff x="9294994" y="4648777"/>
+              <a:chExt cx="720000" cy="1893426"/>
+            </a:xfrm>
+          </p:grpSpPr>
+          <p:pic>
+            <p:nvPicPr>
+              <p:cNvPr id="9" name="Graphique 8" descr="Feux de signalisation avec un remplissage uni">
+                <a:extLst>
+                  <a:ext uri="{FF2B5EF4-FFF2-40B4-BE49-F238E27FC236}">
+                    <a16:creationId xmlns:a16="http://schemas.microsoft.com/office/drawing/2014/main" id="{B0D2B417-5AD4-84D8-9F53-0777E6998AB5}"/>
+                  </a:ext>
+                </a:extLst>
+              </p:cNvPr>
+              <p:cNvPicPr>
+                <a:picLocks noChangeAspect="1"/>
+              </p:cNvPicPr>
+              <p:nvPr/>
+            </p:nvPicPr>
+            <p:blipFill>
+              <a:blip r:embed="rId5">
+                <a:extLst>
+                  <a:ext uri="{96DAC541-7B7A-43D3-8B79-37D633B846F1}">
+                    <asvg:svgBlip xmlns:asvg="http://schemas.microsoft.com/office/drawing/2016/SVG/main" r:embed="rId6"/>
+                  </a:ext>
+                </a:extLst>
+              </a:blip>
+              <a:stretch>
+                <a:fillRect/>
+              </a:stretch>
+            </p:blipFill>
+            <p:spPr>
+              <a:xfrm>
+                <a:off x="9294994" y="4648777"/>
+                <a:ext cx="720000" cy="720000"/>
+              </a:xfrm>
+              <a:prstGeom prst="rect">
+                <a:avLst/>
+              </a:prstGeom>
+            </p:spPr>
+          </p:pic>
+          <p:cxnSp>
+            <p:nvCxnSpPr>
+              <p:cNvPr id="10" name="Connecteur droit 9">
+                <a:extLst>
+                  <a:ext uri="{FF2B5EF4-FFF2-40B4-BE49-F238E27FC236}">
+                    <a16:creationId xmlns:a16="http://schemas.microsoft.com/office/drawing/2014/main" id="{EC5A4611-EA4E-BDEC-D3B2-DD74A5C7B18B}"/>
+                  </a:ext>
+                </a:extLst>
+              </p:cNvPr>
+              <p:cNvCxnSpPr/>
+              <p:nvPr/>
+            </p:nvCxnSpPr>
+            <p:spPr>
+              <a:xfrm>
+                <a:off x="9654994" y="5283936"/>
+                <a:ext cx="0" cy="1258267"/>
+              </a:xfrm>
+              <a:prstGeom prst="line">
+                <a:avLst/>
+              </a:prstGeom>
+              <a:ln/>
+            </p:spPr>
+            <p:style>
+              <a:lnRef idx="3">
+                <a:schemeClr val="dk1"/>
+              </a:lnRef>
+              <a:fillRef idx="0">
+                <a:schemeClr val="dk1"/>
+              </a:fillRef>
+              <a:effectRef idx="2">
+                <a:schemeClr val="dk1"/>
+              </a:effectRef>
+              <a:fontRef idx="minor">
+                <a:schemeClr val="tx1"/>
+              </a:fontRef>
+            </p:style>
+          </p:cxnSp>
+        </p:grpSp>
+      </p:grpSp>
+      <p:pic>
+        <p:nvPicPr>
+          <p:cNvPr id="13" name="Graphique 12" descr="Voiture avec un remplissage uni">
+            <a:extLst>
+              <a:ext uri="{FF2B5EF4-FFF2-40B4-BE49-F238E27FC236}">
+                <a16:creationId xmlns:a16="http://schemas.microsoft.com/office/drawing/2014/main" id="{3A9DC638-9C9E-AF1B-B9C3-F9808A136F2E}"/>
+              </a:ext>
+            </a:extLst>
+          </p:cNvPr>
+          <p:cNvPicPr>
+            <a:picLocks noChangeAspect="1"/>
+          </p:cNvPicPr>
+          <p:nvPr/>
+        </p:nvPicPr>
+        <p:blipFill>
+          <a:blip r:embed="rId3">
+            <a:extLst>
+              <a:ext uri="{96DAC541-7B7A-43D3-8B79-37D633B846F1}">
+                <asvg:svgBlip xmlns:asvg="http://schemas.microsoft.com/office/drawing/2016/SVG/main" r:embed="rId4"/>
+              </a:ext>
+            </a:extLst>
+          </a:blip>
+          <a:stretch>
+            <a:fillRect/>
+          </a:stretch>
+        </p:blipFill>
+        <p:spPr>
+          <a:xfrm>
+            <a:off x="4324036" y="5997745"/>
+            <a:ext cx="720000" cy="720000"/>
+          </a:xfrm>
+          <a:prstGeom prst="rect">
+            <a:avLst/>
+          </a:prstGeom>
+        </p:spPr>
+      </p:pic>
+      <p:pic>
+        <p:nvPicPr>
+          <p:cNvPr id="14" name="Graphique 13" descr="Voiture avec un remplissage uni">
+            <a:extLst>
+              <a:ext uri="{FF2B5EF4-FFF2-40B4-BE49-F238E27FC236}">
+                <a16:creationId xmlns:a16="http://schemas.microsoft.com/office/drawing/2014/main" id="{6D123B5B-850A-3A24-CC95-872A75D16B46}"/>
+              </a:ext>
+            </a:extLst>
+          </p:cNvPr>
+          <p:cNvPicPr>
+            <a:picLocks noChangeAspect="1"/>
+          </p:cNvPicPr>
+          <p:nvPr/>
+        </p:nvPicPr>
+        <p:blipFill>
+          <a:blip r:embed="rId3">
+            <a:extLst>
+              <a:ext uri="{96DAC541-7B7A-43D3-8B79-37D633B846F1}">
+                <asvg:svgBlip xmlns:asvg="http://schemas.microsoft.com/office/drawing/2016/SVG/main" r:embed="rId4"/>
+              </a:ext>
+            </a:extLst>
+          </a:blip>
+          <a:stretch>
+            <a:fillRect/>
+          </a:stretch>
+        </p:blipFill>
+        <p:spPr>
+          <a:xfrm>
+            <a:off x="3211782" y="5997745"/>
+            <a:ext cx="720000" cy="720000"/>
+          </a:xfrm>
+          <a:prstGeom prst="rect">
+            <a:avLst/>
+          </a:prstGeom>
+        </p:spPr>
+      </p:pic>
+      <p:pic>
+        <p:nvPicPr>
+          <p:cNvPr id="15" name="Graphique 14" descr="Voiture avec un remplissage uni">
+            <a:extLst>
+              <a:ext uri="{FF2B5EF4-FFF2-40B4-BE49-F238E27FC236}">
+                <a16:creationId xmlns:a16="http://schemas.microsoft.com/office/drawing/2014/main" id="{FD7E7FCD-BDBC-590F-5FDD-896F64929150}"/>
+              </a:ext>
+            </a:extLst>
+          </p:cNvPr>
+          <p:cNvPicPr>
+            <a:picLocks noChangeAspect="1"/>
+          </p:cNvPicPr>
+          <p:nvPr/>
+        </p:nvPicPr>
+        <p:blipFill>
+          <a:blip r:embed="rId3">
+            <a:extLst>
+              <a:ext uri="{96DAC541-7B7A-43D3-8B79-37D633B846F1}">
+                <asvg:svgBlip xmlns:asvg="http://schemas.microsoft.com/office/drawing/2016/SVG/main" r:embed="rId4"/>
+              </a:ext>
+            </a:extLst>
+          </a:blip>
+          <a:stretch>
+            <a:fillRect/>
+          </a:stretch>
+        </p:blipFill>
+        <p:spPr>
+          <a:xfrm>
+            <a:off x="2099529" y="5997745"/>
+            <a:ext cx="720000" cy="720000"/>
+          </a:xfrm>
+          <a:prstGeom prst="rect">
+            <a:avLst/>
+          </a:prstGeom>
+        </p:spPr>
+      </p:pic>
     </p:spTree>
     <p:extLst>
       <p:ext uri="{BB962C8B-B14F-4D97-AF65-F5344CB8AC3E}">
@@ -17346,7 +17659,7 @@
         <p14:reveal/>
       </p:transition>
     </mc:Choice>
-    <mc:Fallback xmlns="" xmlns:mv="urn:schemas-microsoft-com:mac:vml" xmlns:c="http://schemas.openxmlformats.org/drawingml/2006/chart" xmlns:dgm="http://schemas.openxmlformats.org/drawingml/2006/diagram" xmlns:o="urn:schemas-microsoft-com:office:office" xmlns:v="urn:schemas-microsoft-com:vml" xmlns:pvml="urn:schemas-microsoft-com:office:powerpoint" xmlns:com="http://schemas.openxmlformats.org/drawingml/2006/compatibility" xmlns:p15="http://schemas.microsoft.com/office/powerpoint/2012/main" xmlns:ahyp="http://schemas.microsoft.com/office/drawing/2018/hyperlinkcolor">
+    <mc:Fallback xmlns:ahyp="http://schemas.microsoft.com/office/drawing/2018/hyperlinkcolor" xmlns:p15="http://schemas.microsoft.com/office/powerpoint/2012/main" xmlns:com="http://schemas.openxmlformats.org/drawingml/2006/compatibility" xmlns:pvml="urn:schemas-microsoft-com:office:powerpoint" xmlns:v="urn:schemas-microsoft-com:vml" xmlns:o="urn:schemas-microsoft-com:office:office" xmlns:dgm="http://schemas.openxmlformats.org/drawingml/2006/diagram" xmlns:c="http://schemas.openxmlformats.org/drawingml/2006/chart" xmlns:mv="urn:schemas-microsoft-com:mac:vml" xmlns="">
       <p:transition spd="med">
         <p:fade/>
       </p:transition>
@@ -17418,7 +17731,7 @@
         <p14:reveal/>
       </p:transition>
     </mc:Choice>
-    <mc:Fallback xmlns="" xmlns:mv="urn:schemas-microsoft-com:mac:vml" xmlns:c="http://schemas.openxmlformats.org/drawingml/2006/chart" xmlns:dgm="http://schemas.openxmlformats.org/drawingml/2006/diagram" xmlns:o="urn:schemas-microsoft-com:office:office" xmlns:v="urn:schemas-microsoft-com:vml" xmlns:pvml="urn:schemas-microsoft-com:office:powerpoint" xmlns:com="http://schemas.openxmlformats.org/drawingml/2006/compatibility" xmlns:p15="http://schemas.microsoft.com/office/powerpoint/2012/main" xmlns:ahyp="http://schemas.microsoft.com/office/drawing/2018/hyperlinkcolor">
+    <mc:Fallback xmlns:ahyp="http://schemas.microsoft.com/office/drawing/2018/hyperlinkcolor" xmlns:p15="http://schemas.microsoft.com/office/powerpoint/2012/main" xmlns:com="http://schemas.openxmlformats.org/drawingml/2006/compatibility" xmlns:pvml="urn:schemas-microsoft-com:office:powerpoint" xmlns:v="urn:schemas-microsoft-com:vml" xmlns:o="urn:schemas-microsoft-com:office:office" xmlns:dgm="http://schemas.openxmlformats.org/drawingml/2006/diagram" xmlns:c="http://schemas.openxmlformats.org/drawingml/2006/chart" xmlns:mv="urn:schemas-microsoft-com:mac:vml" xmlns="">
       <p:transition spd="med">
         <p:fade/>
       </p:transition>
@@ -18012,7 +18325,7 @@
         <p14:reveal/>
       </p:transition>
     </mc:Choice>
-    <mc:Fallback xmlns="" xmlns:mv="urn:schemas-microsoft-com:mac:vml" xmlns:c="http://schemas.openxmlformats.org/drawingml/2006/chart" xmlns:dgm="http://schemas.openxmlformats.org/drawingml/2006/diagram" xmlns:o="urn:schemas-microsoft-com:office:office" xmlns:v="urn:schemas-microsoft-com:vml" xmlns:pvml="urn:schemas-microsoft-com:office:powerpoint" xmlns:com="http://schemas.openxmlformats.org/drawingml/2006/compatibility" xmlns:p15="http://schemas.microsoft.com/office/powerpoint/2012/main" xmlns:ahyp="http://schemas.microsoft.com/office/drawing/2018/hyperlinkcolor">
+    <mc:Fallback xmlns:ahyp="http://schemas.microsoft.com/office/drawing/2018/hyperlinkcolor" xmlns:p15="http://schemas.microsoft.com/office/powerpoint/2012/main" xmlns:com="http://schemas.openxmlformats.org/drawingml/2006/compatibility" xmlns:pvml="urn:schemas-microsoft-com:office:powerpoint" xmlns:v="urn:schemas-microsoft-com:vml" xmlns:o="urn:schemas-microsoft-com:office:office" xmlns:dgm="http://schemas.openxmlformats.org/drawingml/2006/diagram" xmlns:c="http://schemas.openxmlformats.org/drawingml/2006/chart" xmlns:mv="urn:schemas-microsoft-com:mac:vml" xmlns="">
       <p:transition spd="med">
         <p:fade/>
       </p:transition>
@@ -18681,7 +18994,7 @@
         <p14:reveal/>
       </p:transition>
     </mc:Choice>
-    <mc:Fallback xmlns="" xmlns:mv="urn:schemas-microsoft-com:mac:vml" xmlns:c="http://schemas.openxmlformats.org/drawingml/2006/chart" xmlns:dgm="http://schemas.openxmlformats.org/drawingml/2006/diagram" xmlns:o="urn:schemas-microsoft-com:office:office" xmlns:v="urn:schemas-microsoft-com:vml" xmlns:pvml="urn:schemas-microsoft-com:office:powerpoint" xmlns:com="http://schemas.openxmlformats.org/drawingml/2006/compatibility" xmlns:p15="http://schemas.microsoft.com/office/powerpoint/2012/main" xmlns:ahyp="http://schemas.microsoft.com/office/drawing/2018/hyperlinkcolor">
+    <mc:Fallback xmlns:ahyp="http://schemas.microsoft.com/office/drawing/2018/hyperlinkcolor" xmlns:p15="http://schemas.microsoft.com/office/powerpoint/2012/main" xmlns:com="http://schemas.openxmlformats.org/drawingml/2006/compatibility" xmlns:pvml="urn:schemas-microsoft-com:office:powerpoint" xmlns:v="urn:schemas-microsoft-com:vml" xmlns:o="urn:schemas-microsoft-com:office:office" xmlns:dgm="http://schemas.openxmlformats.org/drawingml/2006/diagram" xmlns:c="http://schemas.openxmlformats.org/drawingml/2006/chart" xmlns:mv="urn:schemas-microsoft-com:mac:vml" xmlns="">
       <p:transition spd="med">
         <p:fade/>
       </p:transition>
@@ -23726,7 +24039,7 @@
         <p14:reveal/>
       </p:transition>
     </mc:Choice>
-    <mc:Fallback xmlns="" xmlns:mv="urn:schemas-microsoft-com:mac:vml" xmlns:c="http://schemas.openxmlformats.org/drawingml/2006/chart" xmlns:dgm="http://schemas.openxmlformats.org/drawingml/2006/diagram" xmlns:o="urn:schemas-microsoft-com:office:office" xmlns:v="urn:schemas-microsoft-com:vml" xmlns:pvml="urn:schemas-microsoft-com:office:powerpoint" xmlns:com="http://schemas.openxmlformats.org/drawingml/2006/compatibility" xmlns:p15="http://schemas.microsoft.com/office/powerpoint/2012/main" xmlns:ahyp="http://schemas.microsoft.com/office/drawing/2018/hyperlinkcolor">
+    <mc:Fallback xmlns:ahyp="http://schemas.microsoft.com/office/drawing/2018/hyperlinkcolor" xmlns:p15="http://schemas.microsoft.com/office/powerpoint/2012/main" xmlns:com="http://schemas.openxmlformats.org/drawingml/2006/compatibility" xmlns:pvml="urn:schemas-microsoft-com:office:powerpoint" xmlns:v="urn:schemas-microsoft-com:vml" xmlns:o="urn:schemas-microsoft-com:office:office" xmlns:dgm="http://schemas.openxmlformats.org/drawingml/2006/diagram" xmlns:c="http://schemas.openxmlformats.org/drawingml/2006/chart" xmlns:mv="urn:schemas-microsoft-com:mac:vml" xmlns="">
       <p:transition spd="med">
         <p:fade/>
       </p:transition>
@@ -25156,7 +25469,7 @@
         <p14:reveal/>
       </p:transition>
     </mc:Choice>
-    <mc:Fallback xmlns="" xmlns:mv="urn:schemas-microsoft-com:mac:vml" xmlns:c="http://schemas.openxmlformats.org/drawingml/2006/chart" xmlns:dgm="http://schemas.openxmlformats.org/drawingml/2006/diagram" xmlns:o="urn:schemas-microsoft-com:office:office" xmlns:v="urn:schemas-microsoft-com:vml" xmlns:pvml="urn:schemas-microsoft-com:office:powerpoint" xmlns:com="http://schemas.openxmlformats.org/drawingml/2006/compatibility" xmlns:p15="http://schemas.microsoft.com/office/powerpoint/2012/main" xmlns:ahyp="http://schemas.microsoft.com/office/drawing/2018/hyperlinkcolor">
+    <mc:Fallback xmlns:ahyp="http://schemas.microsoft.com/office/drawing/2018/hyperlinkcolor" xmlns:p15="http://schemas.microsoft.com/office/powerpoint/2012/main" xmlns:com="http://schemas.openxmlformats.org/drawingml/2006/compatibility" xmlns:pvml="urn:schemas-microsoft-com:office:powerpoint" xmlns:v="urn:schemas-microsoft-com:vml" xmlns:o="urn:schemas-microsoft-com:office:office" xmlns:dgm="http://schemas.openxmlformats.org/drawingml/2006/diagram" xmlns:c="http://schemas.openxmlformats.org/drawingml/2006/chart" xmlns:mv="urn:schemas-microsoft-com:mac:vml" xmlns="">
       <p:transition spd="med">
         <p:fade/>
       </p:transition>
@@ -25308,7 +25621,7 @@
         <p14:reveal/>
       </p:transition>
     </mc:Choice>
-    <mc:Fallback xmlns="" xmlns:mv="urn:schemas-microsoft-com:mac:vml" xmlns:c="http://schemas.openxmlformats.org/drawingml/2006/chart" xmlns:dgm="http://schemas.openxmlformats.org/drawingml/2006/diagram" xmlns:o="urn:schemas-microsoft-com:office:office" xmlns:v="urn:schemas-microsoft-com:vml" xmlns:pvml="urn:schemas-microsoft-com:office:powerpoint" xmlns:com="http://schemas.openxmlformats.org/drawingml/2006/compatibility" xmlns:p15="http://schemas.microsoft.com/office/powerpoint/2012/main" xmlns:ahyp="http://schemas.microsoft.com/office/drawing/2018/hyperlinkcolor">
+    <mc:Fallback xmlns:ahyp="http://schemas.microsoft.com/office/drawing/2018/hyperlinkcolor" xmlns:p15="http://schemas.microsoft.com/office/powerpoint/2012/main" xmlns:com="http://schemas.openxmlformats.org/drawingml/2006/compatibility" xmlns:pvml="urn:schemas-microsoft-com:office:powerpoint" xmlns:v="urn:schemas-microsoft-com:vml" xmlns:o="urn:schemas-microsoft-com:office:office" xmlns:dgm="http://schemas.openxmlformats.org/drawingml/2006/diagram" xmlns:c="http://schemas.openxmlformats.org/drawingml/2006/chart" xmlns:mv="urn:schemas-microsoft-com:mac:vml" xmlns="">
       <p:transition spd="med">
         <p:fade/>
       </p:transition>
@@ -27966,7 +28279,7 @@
         <p14:reveal/>
       </p:transition>
     </mc:Choice>
-    <mc:Fallback xmlns="" xmlns:mv="urn:schemas-microsoft-com:mac:vml" xmlns:c="http://schemas.openxmlformats.org/drawingml/2006/chart" xmlns:dgm="http://schemas.openxmlformats.org/drawingml/2006/diagram" xmlns:o="urn:schemas-microsoft-com:office:office" xmlns:v="urn:schemas-microsoft-com:vml" xmlns:pvml="urn:schemas-microsoft-com:office:powerpoint" xmlns:com="http://schemas.openxmlformats.org/drawingml/2006/compatibility" xmlns:p15="http://schemas.microsoft.com/office/powerpoint/2012/main" xmlns:ahyp="http://schemas.microsoft.com/office/drawing/2018/hyperlinkcolor">
+    <mc:Fallback xmlns:ahyp="http://schemas.microsoft.com/office/drawing/2018/hyperlinkcolor" xmlns:p15="http://schemas.microsoft.com/office/powerpoint/2012/main" xmlns:com="http://schemas.openxmlformats.org/drawingml/2006/compatibility" xmlns:pvml="urn:schemas-microsoft-com:office:powerpoint" xmlns:v="urn:schemas-microsoft-com:vml" xmlns:o="urn:schemas-microsoft-com:office:office" xmlns:dgm="http://schemas.openxmlformats.org/drawingml/2006/diagram" xmlns:c="http://schemas.openxmlformats.org/drawingml/2006/chart" xmlns:mv="urn:schemas-microsoft-com:mac:vml" xmlns="">
       <p:transition spd="med">
         <p:fade/>
       </p:transition>
@@ -28731,7 +29044,7 @@
         <p14:reveal/>
       </p:transition>
     </mc:Choice>
-    <mc:Fallback xmlns="" xmlns:mv="urn:schemas-microsoft-com:mac:vml" xmlns:c="http://schemas.openxmlformats.org/drawingml/2006/chart" xmlns:dgm="http://schemas.openxmlformats.org/drawingml/2006/diagram" xmlns:o="urn:schemas-microsoft-com:office:office" xmlns:v="urn:schemas-microsoft-com:vml" xmlns:pvml="urn:schemas-microsoft-com:office:powerpoint" xmlns:com="http://schemas.openxmlformats.org/drawingml/2006/compatibility" xmlns:p15="http://schemas.microsoft.com/office/powerpoint/2012/main" xmlns:ahyp="http://schemas.microsoft.com/office/drawing/2018/hyperlinkcolor">
+    <mc:Fallback xmlns:ahyp="http://schemas.microsoft.com/office/drawing/2018/hyperlinkcolor" xmlns:p15="http://schemas.microsoft.com/office/powerpoint/2012/main" xmlns:com="http://schemas.openxmlformats.org/drawingml/2006/compatibility" xmlns:pvml="urn:schemas-microsoft-com:office:powerpoint" xmlns:v="urn:schemas-microsoft-com:vml" xmlns:o="urn:schemas-microsoft-com:office:office" xmlns:dgm="http://schemas.openxmlformats.org/drawingml/2006/diagram" xmlns:c="http://schemas.openxmlformats.org/drawingml/2006/chart" xmlns:mv="urn:schemas-microsoft-com:mac:vml" xmlns="">
       <p:transition spd="med">
         <p:fade/>
       </p:transition>
@@ -28961,7 +29274,7 @@
         <p14:reveal/>
       </p:transition>
     </mc:Choice>
-    <mc:Fallback xmlns="" xmlns:mv="urn:schemas-microsoft-com:mac:vml" xmlns:c="http://schemas.openxmlformats.org/drawingml/2006/chart" xmlns:dgm="http://schemas.openxmlformats.org/drawingml/2006/diagram" xmlns:o="urn:schemas-microsoft-com:office:office" xmlns:v="urn:schemas-microsoft-com:vml" xmlns:pvml="urn:schemas-microsoft-com:office:powerpoint" xmlns:com="http://schemas.openxmlformats.org/drawingml/2006/compatibility" xmlns:p15="http://schemas.microsoft.com/office/powerpoint/2012/main" xmlns:ahyp="http://schemas.microsoft.com/office/drawing/2018/hyperlinkcolor">
+    <mc:Fallback xmlns:ahyp="http://schemas.microsoft.com/office/drawing/2018/hyperlinkcolor" xmlns:p15="http://schemas.microsoft.com/office/powerpoint/2012/main" xmlns:com="http://schemas.openxmlformats.org/drawingml/2006/compatibility" xmlns:pvml="urn:schemas-microsoft-com:office:powerpoint" xmlns:v="urn:schemas-microsoft-com:vml" xmlns:o="urn:schemas-microsoft-com:office:office" xmlns:dgm="http://schemas.openxmlformats.org/drawingml/2006/diagram" xmlns:c="http://schemas.openxmlformats.org/drawingml/2006/chart" xmlns:mv="urn:schemas-microsoft-com:mac:vml" xmlns="">
       <p:transition spd="med">
         <p:fade/>
       </p:transition>
@@ -29016,7 +29329,7 @@
           <a:p>
             <a:r>
               <a:rPr lang="fr-BE"/>
-              <a:t>Chapitre 17-20 : Iterator</a:t>
+              <a:t>Chapitre 17-20 : Strategy</a:t>
             </a:r>
           </a:p>
         </p:txBody>
@@ -29084,13 +29397,13 @@
   <p:clrMapOvr>
     <a:masterClrMapping/>
   </p:clrMapOvr>
-  <mc:AlternateContent xmlns:mc="http://schemas.openxmlformats.org/markup-compatibility/2006">
-    <mc:Choice xmlns:p14="http://schemas.microsoft.com/office/powerpoint/2010/main" Requires="p14">
+  <mc:AlternateContent xmlns:mc="http://schemas.openxmlformats.org/markup-compatibility/2006" xmlns:p14="http://schemas.microsoft.com/office/powerpoint/2010/main">
+    <mc:Choice Requires="p14">
       <p:transition spd="slow">
         <p14:reveal/>
       </p:transition>
     </mc:Choice>
-    <mc:Fallback>
+    <mc:Fallback xmlns="">
       <p:transition spd="slow">
         <p:fade/>
       </p:transition>
@@ -30991,13 +31304,13 @@
   <p:clrMapOvr>
     <a:masterClrMapping/>
   </p:clrMapOvr>
-  <mc:AlternateContent xmlns:mc="http://schemas.openxmlformats.org/markup-compatibility/2006">
-    <mc:Choice xmlns:p14="http://schemas.microsoft.com/office/powerpoint/2010/main" Requires="p14">
+  <mc:AlternateContent xmlns:mc="http://schemas.openxmlformats.org/markup-compatibility/2006" xmlns:p14="http://schemas.microsoft.com/office/powerpoint/2010/main">
+    <mc:Choice Requires="p14">
       <p:transition spd="slow">
         <p14:reveal/>
       </p:transition>
     </mc:Choice>
-    <mc:Fallback>
+    <mc:Fallback xmlns="">
       <p:transition spd="slow">
         <p:fade/>
       </p:transition>
@@ -31560,7 +31873,7 @@
         <p14:reveal/>
       </p:transition>
     </mc:Choice>
-    <mc:Fallback xmlns="" xmlns:mv="urn:schemas-microsoft-com:mac:vml" xmlns:c="http://schemas.openxmlformats.org/drawingml/2006/chart" xmlns:dgm="http://schemas.openxmlformats.org/drawingml/2006/diagram" xmlns:o="urn:schemas-microsoft-com:office:office" xmlns:v="urn:schemas-microsoft-com:vml" xmlns:pvml="urn:schemas-microsoft-com:office:powerpoint" xmlns:com="http://schemas.openxmlformats.org/drawingml/2006/compatibility" xmlns:p15="http://schemas.microsoft.com/office/powerpoint/2012/main" xmlns:ahyp="http://schemas.microsoft.com/office/drawing/2018/hyperlinkcolor">
+    <mc:Fallback xmlns:ahyp="http://schemas.microsoft.com/office/drawing/2018/hyperlinkcolor" xmlns:p15="http://schemas.microsoft.com/office/powerpoint/2012/main" xmlns:com="http://schemas.openxmlformats.org/drawingml/2006/compatibility" xmlns:pvml="urn:schemas-microsoft-com:office:powerpoint" xmlns:v="urn:schemas-microsoft-com:vml" xmlns:o="urn:schemas-microsoft-com:office:office" xmlns:dgm="http://schemas.openxmlformats.org/drawingml/2006/diagram" xmlns:c="http://schemas.openxmlformats.org/drawingml/2006/chart" xmlns:mv="urn:schemas-microsoft-com:mac:vml" xmlns="">
       <p:transition spd="med">
         <p:fade/>
       </p:transition>

</xml_diff>